<commit_message>
Revert to old wireframe. With some Upgrades to CSS using bootstrap
</commit_message>
<xml_diff>
--- a/COSC4351/TEAM PROJECT DELIVERABLES/TEAMOIES.pptx
+++ b/COSC4351/TEAM PROJECT DELIVERABLES/TEAMOIES.pptx
@@ -5,12 +5,13 @@
     <p:sldMasterId id="2147483732" r:id="rId1"/>
   </p:sldMasterIdLst>
   <p:handoutMasterIdLst>
-    <p:handoutMasterId r:id="rId5"/>
+    <p:handoutMasterId r:id="rId6"/>
   </p:handoutMasterIdLst>
   <p:sldIdLst>
     <p:sldId id="256" r:id="rId2"/>
     <p:sldId id="257" r:id="rId3"/>
-    <p:sldId id="258" r:id="rId4"/>
+    <p:sldId id="259" r:id="rId4"/>
+    <p:sldId id="258" r:id="rId5"/>
   </p:sldIdLst>
   <p:sldSz cx="9144000" cy="6858000" type="screen4x3"/>
   <p:notesSz cx="7023100" cy="9309100"/>
@@ -194,7 +195,7 @@
           <a:p>
             <a:fld id="{21A295EC-C5AF-478A-B6B7-ACF964938DD4}" type="datetimeFigureOut">
               <a:rPr lang="en-US" smtClean="0"/>
-              <a:t>3/10/2015</a:t>
+              <a:t>3/31/2015</a:t>
             </a:fld>
             <a:endParaRPr lang="en-US"/>
           </a:p>
@@ -558,7 +559,7 @@
             <a:fld id="{C7F82005-8F97-448F-A12C-2EE43D7D0751}" type="datetimeFigureOut">
               <a:rPr lang="en-US" smtClean="0"/>
               <a:pPr/>
-              <a:t>3/10/2015</a:t>
+              <a:t>3/31/2015</a:t>
             </a:fld>
             <a:endParaRPr lang="en-US"/>
           </a:p>
@@ -953,7 +954,7 @@
             <a:fld id="{C7F82005-8F97-448F-A12C-2EE43D7D0751}" type="datetimeFigureOut">
               <a:rPr lang="en-US" smtClean="0"/>
               <a:pPr/>
-              <a:t>3/10/2015</a:t>
+              <a:t>3/31/2015</a:t>
             </a:fld>
             <a:endParaRPr lang="en-US"/>
           </a:p>
@@ -1488,7 +1489,7 @@
             <a:fld id="{C7F82005-8F97-448F-A12C-2EE43D7D0751}" type="datetimeFigureOut">
               <a:rPr lang="en-US" smtClean="0"/>
               <a:pPr/>
-              <a:t>3/10/2015</a:t>
+              <a:t>3/31/2015</a:t>
             </a:fld>
             <a:endParaRPr lang="en-US"/>
           </a:p>
@@ -1622,7 +1623,7 @@
             <a:fld id="{C7F82005-8F97-448F-A12C-2EE43D7D0751}" type="datetimeFigureOut">
               <a:rPr lang="en-US" smtClean="0"/>
               <a:pPr/>
-              <a:t>3/10/2015</a:t>
+              <a:t>3/31/2015</a:t>
             </a:fld>
             <a:endParaRPr lang="en-US"/>
           </a:p>
@@ -2167,7 +2168,7 @@
             <a:fld id="{C7F82005-8F97-448F-A12C-2EE43D7D0751}" type="datetimeFigureOut">
               <a:rPr lang="en-US" smtClean="0"/>
               <a:pPr/>
-              <a:t>3/10/2015</a:t>
+              <a:t>3/31/2015</a:t>
             </a:fld>
             <a:endParaRPr lang="en-US"/>
           </a:p>
@@ -2464,7 +2465,7 @@
             <a:fld id="{C7F82005-8F97-448F-A12C-2EE43D7D0751}" type="datetimeFigureOut">
               <a:rPr lang="en-US" smtClean="0"/>
               <a:pPr/>
-              <a:t>3/10/2015</a:t>
+              <a:t>3/31/2015</a:t>
             </a:fld>
             <a:endParaRPr lang="en-US"/>
           </a:p>
@@ -3125,7 +3126,7 @@
             <a:fld id="{C7F82005-8F97-448F-A12C-2EE43D7D0751}" type="datetimeFigureOut">
               <a:rPr lang="en-US" smtClean="0"/>
               <a:pPr/>
-              <a:t>3/10/2015</a:t>
+              <a:t>3/31/2015</a:t>
             </a:fld>
             <a:endParaRPr lang="en-US"/>
           </a:p>
@@ -3563,7 +3564,7 @@
             <a:fld id="{C7F82005-8F97-448F-A12C-2EE43D7D0751}" type="datetimeFigureOut">
               <a:rPr lang="en-US" smtClean="0"/>
               <a:pPr/>
-              <a:t>3/10/2015</a:t>
+              <a:t>3/31/2015</a:t>
             </a:fld>
             <a:endParaRPr lang="en-US"/>
           </a:p>
@@ -3878,7 +3879,7 @@
             <a:fld id="{C7F82005-8F97-448F-A12C-2EE43D7D0751}" type="datetimeFigureOut">
               <a:rPr lang="en-US" smtClean="0"/>
               <a:pPr/>
-              <a:t>3/10/2015</a:t>
+              <a:t>3/31/2015</a:t>
             </a:fld>
             <a:endParaRPr lang="en-US"/>
           </a:p>
@@ -4613,7 +4614,7 @@
             <a:fld id="{C7F82005-8F97-448F-A12C-2EE43D7D0751}" type="datetimeFigureOut">
               <a:rPr lang="en-US" smtClean="0"/>
               <a:pPr/>
-              <a:t>3/10/2015</a:t>
+              <a:t>3/31/2015</a:t>
             </a:fld>
             <a:endParaRPr lang="en-US"/>
           </a:p>
@@ -5279,7 +5280,7 @@
             <a:fld id="{C7F82005-8F97-448F-A12C-2EE43D7D0751}" type="datetimeFigureOut">
               <a:rPr lang="en-US" smtClean="0"/>
               <a:pPr/>
-              <a:t>3/10/2015</a:t>
+              <a:t>3/31/2015</a:t>
             </a:fld>
             <a:endParaRPr lang="en-US"/>
           </a:p>
@@ -5553,7 +5554,7 @@
             <a:fld id="{C7F82005-8F97-448F-A12C-2EE43D7D0751}" type="datetimeFigureOut">
               <a:rPr lang="en-US" smtClean="0"/>
               <a:pPr/>
-              <a:t>3/10/2015</a:t>
+              <a:t>3/31/2015</a:t>
             </a:fld>
             <a:endParaRPr lang="en-US"/>
           </a:p>
@@ -6259,7 +6260,7 @@
                   <a:srgbClr val="FF0000"/>
                 </a:solidFill>
               </a:rPr>
-              <a:t>?</a:t>
+              <a:t>4</a:t>
             </a:r>
             <a:r>
               <a:rPr lang="en-US" sz="3200" b="1" dirty="0" smtClean="0"/>
@@ -6352,11 +6353,7 @@
             </a:br>
             <a:r>
               <a:rPr lang="en-US" sz="3200" dirty="0" smtClean="0"/>
-              <a:t>Spring </a:t>
-            </a:r>
-            <a:r>
-              <a:rPr lang="en-US" sz="3200" dirty="0" smtClean="0"/>
-              <a:t>2015</a:t>
+              <a:t>Spring 2015</a:t>
             </a:r>
             <a:endParaRPr lang="en-US" sz="3200" dirty="0"/>
           </a:p>
@@ -6460,12 +6457,12 @@
               <a:t>TEAM</a:t>
             </a:r>
             <a:r>
-              <a:rPr lang="en-US" sz="3600" b="1" dirty="0" smtClean="0">
+              <a:rPr lang="en-US" sz="3600" b="1" dirty="0">
                 <a:solidFill>
                   <a:srgbClr val="FF0000"/>
                 </a:solidFill>
               </a:rPr>
-              <a:t>?</a:t>
+              <a:t>4</a:t>
             </a:r>
             <a:r>
               <a:rPr lang="en-US" sz="3600" b="1" dirty="0" smtClean="0"/>
@@ -6527,7 +6524,7 @@
               <a:t>VAR </a:t>
             </a:r>
             <a:r>
-              <a:rPr lang="en-US" sz="3600" b="1" dirty="0">
+              <a:rPr lang="en-US" sz="3600" b="1" dirty="0" smtClean="0">
                 <a:solidFill>
                   <a:srgbClr val="FF0000"/>
                 </a:solidFill>
@@ -6535,19 +6532,19 @@
               <a:t>S</a:t>
             </a:r>
             <a:r>
+              <a:rPr lang="en-US" sz="3600" dirty="0" smtClean="0"/>
+              <a:t>ystem </a:t>
+            </a:r>
+            <a:r>
               <a:rPr lang="en-US" sz="3600" dirty="0"/>
-              <a:t>ystem </a:t>
+              <a:t/>
             </a:r>
             <a:br>
               <a:rPr lang="en-US" sz="3600" dirty="0"/>
             </a:br>
             <a:r>
               <a:rPr lang="en-US" dirty="0" smtClean="0"/>
-              <a:t>DATABASE </a:t>
-            </a:r>
-            <a:r>
-              <a:rPr lang="en-US" dirty="0" smtClean="0"/>
-              <a:t>BACK END</a:t>
+              <a:t>DATABASE BACK END</a:t>
             </a:r>
             <a:endParaRPr lang="en-US" dirty="0"/>
           </a:p>
@@ -6584,6 +6581,163 @@
             <a:r>
               <a:rPr lang="en-US" dirty="0" smtClean="0"/>
               <a:t>Please place these as dividers </a:t>
+            </a:r>
+            <a:endParaRPr lang="en-US" dirty="0"/>
+          </a:p>
+        </p:txBody>
+      </p:sp>
+      <p:pic>
+        <p:nvPicPr>
+          <p:cNvPr id="1026" name="Picture 2"/>
+          <p:cNvPicPr>
+            <a:picLocks noChangeAspect="1" noChangeArrowheads="1"/>
+          </p:cNvPicPr>
+          <p:nvPr/>
+        </p:nvPicPr>
+        <p:blipFill>
+          <a:blip r:embed="rId2">
+            <a:extLst>
+              <a:ext uri="{28A0092B-C50C-407E-A947-70E740481C1C}">
+                <a14:useLocalDpi xmlns:a14="http://schemas.microsoft.com/office/drawing/2010/main" val="0"/>
+              </a:ext>
+            </a:extLst>
+          </a:blip>
+          <a:srcRect/>
+          <a:stretch>
+            <a:fillRect/>
+          </a:stretch>
+        </p:blipFill>
+        <p:spPr bwMode="auto">
+          <a:xfrm>
+            <a:off x="457200" y="1676400"/>
+            <a:ext cx="3810866" cy="4457700"/>
+          </a:xfrm>
+          <a:prstGeom prst="rect">
+            <a:avLst/>
+          </a:prstGeom>
+          <a:noFill/>
+          <a:ln>
+            <a:noFill/>
+          </a:ln>
+          <a:extLst>
+            <a:ext uri="{909E8E84-426E-40DD-AFC4-6F175D3DCCD1}">
+              <a14:hiddenFill xmlns:a14="http://schemas.microsoft.com/office/drawing/2010/main">
+                <a:solidFill>
+                  <a:schemeClr val="accent1"/>
+                </a:solidFill>
+              </a14:hiddenFill>
+            </a:ext>
+            <a:ext uri="{91240B29-F687-4F45-9708-019B960494DF}">
+              <a14:hiddenLine xmlns:a14="http://schemas.microsoft.com/office/drawing/2010/main" w="9525">
+                <a:solidFill>
+                  <a:schemeClr val="tx1"/>
+                </a:solidFill>
+                <a:miter lim="800000"/>
+                <a:headEnd/>
+                <a:tailEnd/>
+              </a14:hiddenLine>
+            </a:ext>
+          </a:extLst>
+        </p:spPr>
+      </p:pic>
+      <p:sp>
+        <p:nvSpPr>
+          <p:cNvPr id="4" name="TextBox 3"/>
+          <p:cNvSpPr txBox="1"/>
+          <p:nvPr/>
+        </p:nvSpPr>
+        <p:spPr>
+          <a:xfrm>
+            <a:off x="4702629" y="3200400"/>
+            <a:ext cx="3581400" cy="2308324"/>
+          </a:xfrm>
+          <a:prstGeom prst="rect">
+            <a:avLst/>
+          </a:prstGeom>
+          <a:noFill/>
+        </p:spPr>
+        <p:txBody>
+          <a:bodyPr wrap="square" rtlCol="0">
+            <a:spAutoFit/>
+          </a:bodyPr>
+          <a:lstStyle/>
+          <a:p>
+            <a:r>
+              <a:rPr lang="en-US" b="1" i="1" dirty="0"/>
+              <a:t># of </a:t>
+            </a:r>
+            <a:r>
+              <a:rPr lang="en-US" b="1" i="1" dirty="0" err="1"/>
+              <a:t>Es</a:t>
+            </a:r>
+            <a:r>
+              <a:rPr lang="en-US" b="1" i="1" dirty="0"/>
+              <a:t>:  10</a:t>
+            </a:r>
+            <a:endParaRPr lang="en-US" dirty="0"/>
+          </a:p>
+          <a:p>
+            <a:r>
+              <a:rPr lang="en-US" b="1" i="1" dirty="0"/>
+              <a:t># of </a:t>
+            </a:r>
+            <a:r>
+              <a:rPr lang="en-US" b="1" i="1" dirty="0" err="1"/>
+              <a:t>Rs</a:t>
+            </a:r>
+            <a:r>
+              <a:rPr lang="en-US" b="1" i="1" dirty="0"/>
+              <a:t>:  8</a:t>
+            </a:r>
+            <a:endParaRPr lang="en-US" dirty="0"/>
+          </a:p>
+          <a:p>
+            <a:r>
+              <a:rPr lang="en-US" b="1" i="1" dirty="0"/>
+              <a:t># of Vs:  1</a:t>
+            </a:r>
+            <a:endParaRPr lang="en-US" dirty="0"/>
+          </a:p>
+          <a:p>
+            <a:r>
+              <a:rPr lang="en-US" b="1" i="1" dirty="0"/>
+              <a:t># of </a:t>
+            </a:r>
+            <a:r>
+              <a:rPr lang="en-US" b="1" i="1" dirty="0" err="1"/>
+              <a:t>Ts</a:t>
+            </a:r>
+            <a:r>
+              <a:rPr lang="en-US" b="1" i="1" dirty="0"/>
+              <a:t>:  1</a:t>
+            </a:r>
+            <a:endParaRPr lang="en-US" dirty="0"/>
+          </a:p>
+          <a:p>
+            <a:r>
+              <a:rPr lang="en-US" b="1" i="1" dirty="0"/>
+              <a:t> </a:t>
+            </a:r>
+            <a:endParaRPr lang="en-US" dirty="0"/>
+          </a:p>
+          <a:p>
+            <a:r>
+              <a:rPr lang="en-US" b="1" i="1" dirty="0"/>
+              <a:t># of Ds:  18    </a:t>
+            </a:r>
+            <a:endParaRPr lang="en-US" dirty="0"/>
+          </a:p>
+          <a:p>
+            <a:r>
+              <a:rPr lang="en-US" b="1" i="1" dirty="0"/>
+              <a:t> </a:t>
+            </a:r>
+            <a:endParaRPr lang="en-US" dirty="0"/>
+          </a:p>
+          <a:p>
+            <a:r>
+              <a:rPr lang="en-US" b="1" i="1" dirty="0"/>
+              <a:t># of Cs:  12 </a:t>
             </a:r>
             <a:endParaRPr lang="en-US" dirty="0"/>
           </a:p>
@@ -6631,7 +6785,7 @@
         </p:nvSpPr>
         <p:spPr>
           <a:xfrm>
-            <a:off x="304800" y="762000"/>
+            <a:off x="609600" y="685800"/>
             <a:ext cx="8534400" cy="758952"/>
           </a:xfrm>
         </p:spPr>
@@ -6651,7 +6805,7 @@
                   <a:srgbClr val="FF0000"/>
                 </a:solidFill>
               </a:rPr>
-              <a:t>?</a:t>
+              <a:t>4</a:t>
             </a:r>
             <a:r>
               <a:rPr lang="en-US" sz="3600" b="1" dirty="0" smtClean="0"/>
@@ -6729,11 +6883,7 @@
             </a:br>
             <a:r>
               <a:rPr lang="en-US" dirty="0" smtClean="0"/>
-              <a:t>FRONT </a:t>
-            </a:r>
-            <a:r>
-              <a:rPr lang="en-US" dirty="0" smtClean="0"/>
-              <a:t>END</a:t>
+              <a:t>DATABASE BACK END</a:t>
             </a:r>
             <a:endParaRPr lang="en-US" dirty="0"/>
           </a:p>
@@ -6749,6 +6899,336 @@
             <p:ph sz="quarter" idx="1"/>
           </p:nvPr>
         </p:nvSpPr>
+        <p:spPr/>
+        <p:txBody>
+          <a:bodyPr/>
+          <a:lstStyle/>
+          <a:p>
+            <a:r>
+              <a:rPr lang="en-US" dirty="0" smtClean="0"/>
+              <a:t>Relations…?</a:t>
+            </a:r>
+          </a:p>
+          <a:p>
+            <a:r>
+              <a:rPr lang="en-US" dirty="0" smtClean="0"/>
+              <a:t>1 to 1, Many to 1…?</a:t>
+            </a:r>
+          </a:p>
+          <a:p>
+            <a:r>
+              <a:rPr lang="en-US" dirty="0" smtClean="0"/>
+              <a:t>Picture of ERD…?</a:t>
+            </a:r>
+          </a:p>
+        </p:txBody>
+      </p:sp>
+      <p:pic>
+        <p:nvPicPr>
+          <p:cNvPr id="2050" name="Picture 2"/>
+          <p:cNvPicPr>
+            <a:picLocks noChangeAspect="1" noChangeArrowheads="1"/>
+          </p:cNvPicPr>
+          <p:nvPr/>
+        </p:nvPicPr>
+        <p:blipFill>
+          <a:blip r:embed="rId2">
+            <a:extLst>
+              <a:ext uri="{28A0092B-C50C-407E-A947-70E740481C1C}">
+                <a14:useLocalDpi xmlns:a14="http://schemas.microsoft.com/office/drawing/2010/main" val="0"/>
+              </a:ext>
+            </a:extLst>
+          </a:blip>
+          <a:srcRect/>
+          <a:stretch>
+            <a:fillRect/>
+          </a:stretch>
+        </p:blipFill>
+        <p:spPr bwMode="auto">
+          <a:xfrm>
+            <a:off x="304800" y="1524000"/>
+            <a:ext cx="3733437" cy="4835979"/>
+          </a:xfrm>
+          <a:prstGeom prst="rect">
+            <a:avLst/>
+          </a:prstGeom>
+          <a:noFill/>
+          <a:ln>
+            <a:noFill/>
+          </a:ln>
+          <a:extLst>
+            <a:ext uri="{909E8E84-426E-40DD-AFC4-6F175D3DCCD1}">
+              <a14:hiddenFill xmlns:a14="http://schemas.microsoft.com/office/drawing/2010/main">
+                <a:solidFill>
+                  <a:schemeClr val="accent1"/>
+                </a:solidFill>
+              </a14:hiddenFill>
+            </a:ext>
+            <a:ext uri="{91240B29-F687-4F45-9708-019B960494DF}">
+              <a14:hiddenLine xmlns:a14="http://schemas.microsoft.com/office/drawing/2010/main" w="9525">
+                <a:solidFill>
+                  <a:schemeClr val="tx1"/>
+                </a:solidFill>
+                <a:miter lim="800000"/>
+                <a:headEnd/>
+                <a:tailEnd/>
+              </a14:hiddenLine>
+            </a:ext>
+          </a:extLst>
+        </p:spPr>
+      </p:pic>
+      <p:sp>
+        <p:nvSpPr>
+          <p:cNvPr id="4" name="TextBox 3"/>
+          <p:cNvSpPr txBox="1"/>
+          <p:nvPr/>
+        </p:nvSpPr>
+        <p:spPr>
+          <a:xfrm>
+            <a:off x="4876800" y="2895600"/>
+            <a:ext cx="3124200" cy="2031325"/>
+          </a:xfrm>
+          <a:prstGeom prst="rect">
+            <a:avLst/>
+          </a:prstGeom>
+          <a:noFill/>
+        </p:spPr>
+        <p:txBody>
+          <a:bodyPr wrap="square" rtlCol="0">
+            <a:spAutoFit/>
+          </a:bodyPr>
+          <a:lstStyle/>
+          <a:p>
+            <a:r>
+              <a:rPr lang="en-US" b="1" i="1" dirty="0"/>
+              <a:t>What Data (analysis):</a:t>
+            </a:r>
+            <a:endParaRPr lang="en-US" dirty="0"/>
+          </a:p>
+          <a:p>
+            <a:r>
+              <a:rPr lang="en-US" b="1" i="1" dirty="0"/>
+              <a:t># of </a:t>
+            </a:r>
+            <a:r>
+              <a:rPr lang="en-US" b="1" i="1" dirty="0" err="1"/>
+              <a:t>Es</a:t>
+            </a:r>
+            <a:r>
+              <a:rPr lang="en-US" b="1" i="1" dirty="0"/>
+              <a:t>:  </a:t>
+            </a:r>
+            <a:r>
+              <a:rPr lang="en-US" b="1" i="1" u="sng" dirty="0"/>
+              <a:t>10</a:t>
+            </a:r>
+            <a:endParaRPr lang="en-US" dirty="0"/>
+          </a:p>
+          <a:p>
+            <a:r>
+              <a:rPr lang="en-US" b="1" i="1" dirty="0"/>
+              <a:t># of </a:t>
+            </a:r>
+            <a:r>
+              <a:rPr lang="en-US" b="1" i="1" dirty="0" err="1"/>
+              <a:t>Rs</a:t>
+            </a:r>
+            <a:r>
+              <a:rPr lang="en-US" b="1" i="1" dirty="0"/>
+              <a:t>:  </a:t>
+            </a:r>
+            <a:r>
+              <a:rPr lang="en-US" b="1" i="1" u="sng" dirty="0"/>
+              <a:t>8</a:t>
+            </a:r>
+            <a:endParaRPr lang="en-US" dirty="0"/>
+          </a:p>
+          <a:p>
+            <a:r>
+              <a:rPr lang="en-US" b="1" i="1" dirty="0"/>
+              <a:t> </a:t>
+            </a:r>
+            <a:endParaRPr lang="en-US" dirty="0"/>
+          </a:p>
+          <a:p>
+            <a:r>
+              <a:rPr lang="en-US" b="1" i="1" dirty="0"/>
+              <a:t>HOW Data (design):</a:t>
+            </a:r>
+            <a:endParaRPr lang="en-US" dirty="0"/>
+          </a:p>
+          <a:p>
+            <a:r>
+              <a:rPr lang="en-US" b="1" i="1" dirty="0"/>
+              <a:t># of Relations:  </a:t>
+            </a:r>
+            <a:r>
+              <a:rPr lang="en-US" b="1" i="1" u="sng" dirty="0"/>
+              <a:t>10</a:t>
+            </a:r>
+            <a:endParaRPr lang="en-US" dirty="0"/>
+          </a:p>
+          <a:p>
+            <a:endParaRPr lang="en-US" dirty="0"/>
+          </a:p>
+        </p:txBody>
+      </p:sp>
+    </p:spTree>
+    <p:extLst>
+      <p:ext uri="{BB962C8B-B14F-4D97-AF65-F5344CB8AC3E}">
+        <p14:creationId xmlns:p14="http://schemas.microsoft.com/office/powerpoint/2010/main" val="2526043119"/>
+      </p:ext>
+    </p:extLst>
+  </p:cSld>
+  <p:clrMapOvr>
+    <a:masterClrMapping/>
+  </p:clrMapOvr>
+</p:sld>
+</file>
+
+<file path=ppt/slides/slide4.xml><?xml version="1.0" encoding="utf-8"?>
+<p:sld xmlns:a="http://schemas.openxmlformats.org/drawingml/2006/main" xmlns:r="http://schemas.openxmlformats.org/officeDocument/2006/relationships" xmlns:p="http://schemas.openxmlformats.org/presentationml/2006/main">
+  <p:cSld>
+    <p:spTree>
+      <p:nvGrpSpPr>
+        <p:cNvPr id="1" name=""/>
+        <p:cNvGrpSpPr/>
+        <p:nvPr/>
+      </p:nvGrpSpPr>
+      <p:grpSpPr>
+        <a:xfrm>
+          <a:off x="0" y="0"/>
+          <a:ext cx="0" cy="0"/>
+          <a:chOff x="0" y="0"/>
+          <a:chExt cx="0" cy="0"/>
+        </a:xfrm>
+      </p:grpSpPr>
+      <p:sp>
+        <p:nvSpPr>
+          <p:cNvPr id="2" name="Title 1"/>
+          <p:cNvSpPr>
+            <a:spLocks noGrp="1"/>
+          </p:cNvSpPr>
+          <p:nvPr>
+            <p:ph type="title"/>
+          </p:nvPr>
+        </p:nvSpPr>
+        <p:spPr>
+          <a:xfrm>
+            <a:off x="304800" y="762000"/>
+            <a:ext cx="8534400" cy="758952"/>
+          </a:xfrm>
+        </p:spPr>
+        <p:txBody>
+          <a:bodyPr>
+            <a:normAutofit fontScale="90000"/>
+          </a:bodyPr>
+          <a:lstStyle/>
+          <a:p>
+            <a:r>
+              <a:rPr lang="en-US" sz="3600" b="1" dirty="0" smtClean="0"/>
+              <a:t>TEAM</a:t>
+            </a:r>
+            <a:r>
+              <a:rPr lang="en-US" sz="3600" b="1" dirty="0" smtClean="0">
+                <a:solidFill>
+                  <a:srgbClr val="FF0000"/>
+                </a:solidFill>
+              </a:rPr>
+              <a:t>4</a:t>
+            </a:r>
+            <a:r>
+              <a:rPr lang="en-US" sz="3600" b="1" dirty="0" smtClean="0"/>
+              <a:t>O</a:t>
+            </a:r>
+            <a:r>
+              <a:rPr lang="en-US" sz="3600" b="1" dirty="0" smtClean="0">
+                <a:solidFill>
+                  <a:srgbClr val="FF0000"/>
+                </a:solidFill>
+              </a:rPr>
+              <a:t>IE</a:t>
+            </a:r>
+            <a:r>
+              <a:rPr lang="en-US" sz="3600" b="1" dirty="0" smtClean="0"/>
+              <a:t>S</a:t>
+            </a:r>
+            <a:r>
+              <a:rPr lang="en-US" sz="3600" dirty="0"/>
+              <a:t/>
+            </a:r>
+            <a:br>
+              <a:rPr lang="en-US" sz="3600" dirty="0"/>
+            </a:br>
+            <a:r>
+              <a:rPr lang="en-US" sz="3600" b="1" dirty="0">
+                <a:solidFill>
+                  <a:srgbClr val="FF0000"/>
+                </a:solidFill>
+              </a:rPr>
+              <a:t>O</a:t>
+            </a:r>
+            <a:r>
+              <a:rPr lang="en-US" sz="3600" dirty="0"/>
+              <a:t>nline </a:t>
+            </a:r>
+            <a:r>
+              <a:rPr lang="en-US" sz="3600" b="1" dirty="0">
+                <a:solidFill>
+                  <a:srgbClr val="FF0000"/>
+                </a:solidFill>
+              </a:rPr>
+              <a:t>I</a:t>
+            </a:r>
+            <a:r>
+              <a:rPr lang="en-US" sz="3600" dirty="0"/>
+              <a:t>nternational </a:t>
+            </a:r>
+            <a:r>
+              <a:rPr lang="en-US" sz="3600" b="1" dirty="0">
+                <a:solidFill>
+                  <a:srgbClr val="FF0000"/>
+                </a:solidFill>
+              </a:rPr>
+              <a:t>E</a:t>
+            </a:r>
+            <a:r>
+              <a:rPr lang="en-US" sz="3600" dirty="0"/>
+              <a:t>VAR </a:t>
+            </a:r>
+            <a:r>
+              <a:rPr lang="en-US" sz="3600" b="1" dirty="0">
+                <a:solidFill>
+                  <a:srgbClr val="FF0000"/>
+                </a:solidFill>
+              </a:rPr>
+              <a:t>S</a:t>
+            </a:r>
+            <a:r>
+              <a:rPr lang="en-US" sz="3600" dirty="0"/>
+              <a:t>ystem </a:t>
+            </a:r>
+            <a:br>
+              <a:rPr lang="en-US" sz="3600" dirty="0"/>
+            </a:br>
+            <a:r>
+              <a:rPr lang="en-US" dirty="0" smtClean="0"/>
+              <a:t>FRONT END</a:t>
+            </a:r>
+            <a:endParaRPr lang="en-US" dirty="0"/>
+          </a:p>
+        </p:txBody>
+      </p:sp>
+      <p:sp>
+        <p:nvSpPr>
+          <p:cNvPr id="3" name="Content Placeholder 2"/>
+          <p:cNvSpPr>
+            <a:spLocks noGrp="1"/>
+          </p:cNvSpPr>
+          <p:nvPr>
+            <p:ph sz="quarter" idx="1"/>
+          </p:nvPr>
+        </p:nvSpPr>
         <p:spPr>
           <a:xfrm>
             <a:off x="320040" y="1981200"/>
@@ -6761,11 +7241,7 @@
           <a:p>
             <a:r>
               <a:rPr lang="en-US" dirty="0" smtClean="0"/>
-              <a:t>Added by VH</a:t>
-            </a:r>
-            <a:r>
-              <a:rPr lang="en-US" dirty="0" smtClean="0"/>
-              <a:t>;</a:t>
+              <a:t>Added by VH;</a:t>
             </a:r>
             <a:endParaRPr lang="en-US" dirty="0"/>
           </a:p>

</xml_diff>